<commit_message>
- updated the presentation
</commit_message>
<xml_diff>
--- a/apresentacao.pptx
+++ b/apresentacao.pptx
@@ -112,6 +112,11 @@
       </a:defRPr>
     </a:lvl9pPr>
   </p:defaultTextStyle>
+  <p:extLst>
+    <p:ext uri="{EFAFB233-063F-42B5-8137-9DF3F51BA10A}">
+      <p15:sldGuideLst xmlns:p15="http://schemas.microsoft.com/office/powerpoint/2012/main"/>
+    </p:ext>
+  </p:extLst>
 </p:presentation>
 </file>
 
@@ -4029,12 +4034,42 @@
           <a:p>
             <a:r>
               <a:rPr lang="pt-BR" dirty="0"/>
-              <a:t>DOJO CINQ 2018</a:t>
-            </a:r>
-            <a:endParaRPr lang="en-US" dirty="0"/>
-          </a:p>
-        </p:txBody>
-      </p:sp>
+              <a:t>DOJO CINQ 2018’</a:t>
+            </a:r>
+            <a:endParaRPr lang="en-US" dirty="0"/>
+          </a:p>
+        </p:txBody>
+      </p:sp>
+      <p:pic>
+        <p:nvPicPr>
+          <p:cNvPr id="5" name="Picture 4">
+            <a:extLst>
+              <a:ext uri="{FF2B5EF4-FFF2-40B4-BE49-F238E27FC236}">
+                <a16:creationId xmlns:a16="http://schemas.microsoft.com/office/drawing/2014/main" id="{B63F8143-AF30-4423-AC77-208929B6C0C7}"/>
+              </a:ext>
+            </a:extLst>
+          </p:cNvPr>
+          <p:cNvPicPr>
+            <a:picLocks noChangeAspect="1"/>
+          </p:cNvPicPr>
+          <p:nvPr/>
+        </p:nvPicPr>
+        <p:blipFill>
+          <a:blip r:embed="rId2"/>
+          <a:stretch>
+            <a:fillRect/>
+          </a:stretch>
+        </p:blipFill>
+        <p:spPr>
+          <a:xfrm>
+            <a:off x="9520543" y="5534287"/>
+            <a:ext cx="1657350" cy="990600"/>
+          </a:xfrm>
+          <a:prstGeom prst="rect">
+            <a:avLst/>
+          </a:prstGeom>
+        </p:spPr>
+      </p:pic>
     </p:spTree>
     <p:extLst>
       <p:ext uri="{BB962C8B-B14F-4D97-AF65-F5344CB8AC3E}">
@@ -4133,6 +4168,36 @@
           </a:p>
         </p:txBody>
       </p:sp>
+      <p:pic>
+        <p:nvPicPr>
+          <p:cNvPr id="4" name="Picture 3">
+            <a:extLst>
+              <a:ext uri="{FF2B5EF4-FFF2-40B4-BE49-F238E27FC236}">
+                <a16:creationId xmlns:a16="http://schemas.microsoft.com/office/drawing/2014/main" id="{097ACE28-8031-47EE-AFBB-05BE7B4B1227}"/>
+              </a:ext>
+            </a:extLst>
+          </p:cNvPr>
+          <p:cNvPicPr>
+            <a:picLocks noChangeAspect="1"/>
+          </p:cNvPicPr>
+          <p:nvPr/>
+        </p:nvPicPr>
+        <p:blipFill>
+          <a:blip r:embed="rId2"/>
+          <a:stretch>
+            <a:fillRect/>
+          </a:stretch>
+        </p:blipFill>
+        <p:spPr>
+          <a:xfrm>
+            <a:off x="9520543" y="5534287"/>
+            <a:ext cx="1657350" cy="990600"/>
+          </a:xfrm>
+          <a:prstGeom prst="rect">
+            <a:avLst/>
+          </a:prstGeom>
+        </p:spPr>
+      </p:pic>
     </p:spTree>
     <p:extLst>
       <p:ext uri="{BB962C8B-B14F-4D97-AF65-F5344CB8AC3E}">
@@ -4225,6 +4290,36 @@
           </a:p>
         </p:txBody>
       </p:sp>
+      <p:pic>
+        <p:nvPicPr>
+          <p:cNvPr id="4" name="Picture 3">
+            <a:extLst>
+              <a:ext uri="{FF2B5EF4-FFF2-40B4-BE49-F238E27FC236}">
+                <a16:creationId xmlns:a16="http://schemas.microsoft.com/office/drawing/2014/main" id="{0D77C025-2A9F-4EE6-9D54-6084B3A26423}"/>
+              </a:ext>
+            </a:extLst>
+          </p:cNvPr>
+          <p:cNvPicPr>
+            <a:picLocks noChangeAspect="1"/>
+          </p:cNvPicPr>
+          <p:nvPr/>
+        </p:nvPicPr>
+        <p:blipFill>
+          <a:blip r:embed="rId2"/>
+          <a:stretch>
+            <a:fillRect/>
+          </a:stretch>
+        </p:blipFill>
+        <p:spPr>
+          <a:xfrm>
+            <a:off x="9520543" y="5534287"/>
+            <a:ext cx="1657350" cy="990600"/>
+          </a:xfrm>
+          <a:prstGeom prst="rect">
+            <a:avLst/>
+          </a:prstGeom>
+        </p:spPr>
+      </p:pic>
     </p:spTree>
     <p:extLst>
       <p:ext uri="{BB962C8B-B14F-4D97-AF65-F5344CB8AC3E}">
@@ -4377,6 +4472,36 @@
           </a:p>
         </p:txBody>
       </p:sp>
+      <p:pic>
+        <p:nvPicPr>
+          <p:cNvPr id="5" name="Picture 4">
+            <a:extLst>
+              <a:ext uri="{FF2B5EF4-FFF2-40B4-BE49-F238E27FC236}">
+                <a16:creationId xmlns:a16="http://schemas.microsoft.com/office/drawing/2014/main" id="{499D64CD-C424-4304-812A-E90747635912}"/>
+              </a:ext>
+            </a:extLst>
+          </p:cNvPr>
+          <p:cNvPicPr>
+            <a:picLocks noChangeAspect="1"/>
+          </p:cNvPicPr>
+          <p:nvPr/>
+        </p:nvPicPr>
+        <p:blipFill>
+          <a:blip r:embed="rId2"/>
+          <a:stretch>
+            <a:fillRect/>
+          </a:stretch>
+        </p:blipFill>
+        <p:spPr>
+          <a:xfrm>
+            <a:off x="9520543" y="5534287"/>
+            <a:ext cx="1657350" cy="990600"/>
+          </a:xfrm>
+          <a:prstGeom prst="rect">
+            <a:avLst/>
+          </a:prstGeom>
+        </p:spPr>
+      </p:pic>
     </p:spTree>
     <p:extLst>
       <p:ext uri="{BB962C8B-B14F-4D97-AF65-F5344CB8AC3E}">
@@ -4549,6 +4674,36 @@
           </a:p>
         </p:txBody>
       </p:sp>
+      <p:pic>
+        <p:nvPicPr>
+          <p:cNvPr id="5" name="Picture 4">
+            <a:extLst>
+              <a:ext uri="{FF2B5EF4-FFF2-40B4-BE49-F238E27FC236}">
+                <a16:creationId xmlns:a16="http://schemas.microsoft.com/office/drawing/2014/main" id="{58CEAF47-3D6E-41F6-9289-C7B20850758D}"/>
+              </a:ext>
+            </a:extLst>
+          </p:cNvPr>
+          <p:cNvPicPr>
+            <a:picLocks noChangeAspect="1"/>
+          </p:cNvPicPr>
+          <p:nvPr/>
+        </p:nvPicPr>
+        <p:blipFill>
+          <a:blip r:embed="rId2"/>
+          <a:stretch>
+            <a:fillRect/>
+          </a:stretch>
+        </p:blipFill>
+        <p:spPr>
+          <a:xfrm>
+            <a:off x="9520543" y="5534287"/>
+            <a:ext cx="1657350" cy="990600"/>
+          </a:xfrm>
+          <a:prstGeom prst="rect">
+            <a:avLst/>
+          </a:prstGeom>
+        </p:spPr>
+      </p:pic>
     </p:spTree>
     <p:extLst>
       <p:ext uri="{BB962C8B-B14F-4D97-AF65-F5344CB8AC3E}">
@@ -4706,6 +4861,36 @@
           </a:p>
         </p:txBody>
       </p:sp>
+      <p:pic>
+        <p:nvPicPr>
+          <p:cNvPr id="5" name="Picture 4">
+            <a:extLst>
+              <a:ext uri="{FF2B5EF4-FFF2-40B4-BE49-F238E27FC236}">
+                <a16:creationId xmlns:a16="http://schemas.microsoft.com/office/drawing/2014/main" id="{01E27905-3ACA-484B-B9B5-0727B547457A}"/>
+              </a:ext>
+            </a:extLst>
+          </p:cNvPr>
+          <p:cNvPicPr>
+            <a:picLocks noChangeAspect="1"/>
+          </p:cNvPicPr>
+          <p:nvPr/>
+        </p:nvPicPr>
+        <p:blipFill>
+          <a:blip r:embed="rId2"/>
+          <a:stretch>
+            <a:fillRect/>
+          </a:stretch>
+        </p:blipFill>
+        <p:spPr>
+          <a:xfrm>
+            <a:off x="9520543" y="5534287"/>
+            <a:ext cx="1657350" cy="990600"/>
+          </a:xfrm>
+          <a:prstGeom prst="rect">
+            <a:avLst/>
+          </a:prstGeom>
+        </p:spPr>
+      </p:pic>
     </p:spTree>
     <p:extLst>
       <p:ext uri="{BB962C8B-B14F-4D97-AF65-F5344CB8AC3E}">
@@ -4863,6 +5048,36 @@
           </a:p>
         </p:txBody>
       </p:sp>
+      <p:pic>
+        <p:nvPicPr>
+          <p:cNvPr id="5" name="Picture 4">
+            <a:extLst>
+              <a:ext uri="{FF2B5EF4-FFF2-40B4-BE49-F238E27FC236}">
+                <a16:creationId xmlns:a16="http://schemas.microsoft.com/office/drawing/2014/main" id="{8C940A44-5A61-4CEA-91E4-6D627FAB5769}"/>
+              </a:ext>
+            </a:extLst>
+          </p:cNvPr>
+          <p:cNvPicPr>
+            <a:picLocks noChangeAspect="1"/>
+          </p:cNvPicPr>
+          <p:nvPr/>
+        </p:nvPicPr>
+        <p:blipFill>
+          <a:blip r:embed="rId2"/>
+          <a:stretch>
+            <a:fillRect/>
+          </a:stretch>
+        </p:blipFill>
+        <p:spPr>
+          <a:xfrm>
+            <a:off x="9520543" y="5534287"/>
+            <a:ext cx="1657350" cy="990600"/>
+          </a:xfrm>
+          <a:prstGeom prst="rect">
+            <a:avLst/>
+          </a:prstGeom>
+        </p:spPr>
+      </p:pic>
     </p:spTree>
     <p:extLst>
       <p:ext uri="{BB962C8B-B14F-4D97-AF65-F5344CB8AC3E}">
@@ -5027,6 +5242,36 @@
           </a:p>
         </p:txBody>
       </p:sp>
+      <p:pic>
+        <p:nvPicPr>
+          <p:cNvPr id="5" name="Picture 4">
+            <a:extLst>
+              <a:ext uri="{FF2B5EF4-FFF2-40B4-BE49-F238E27FC236}">
+                <a16:creationId xmlns:a16="http://schemas.microsoft.com/office/drawing/2014/main" id="{9BE215DA-642A-4078-B5FC-743CEC012B97}"/>
+              </a:ext>
+            </a:extLst>
+          </p:cNvPr>
+          <p:cNvPicPr>
+            <a:picLocks noChangeAspect="1"/>
+          </p:cNvPicPr>
+          <p:nvPr/>
+        </p:nvPicPr>
+        <p:blipFill>
+          <a:blip r:embed="rId2"/>
+          <a:stretch>
+            <a:fillRect/>
+          </a:stretch>
+        </p:blipFill>
+        <p:spPr>
+          <a:xfrm>
+            <a:off x="9520543" y="5534287"/>
+            <a:ext cx="1657350" cy="990600"/>
+          </a:xfrm>
+          <a:prstGeom prst="rect">
+            <a:avLst/>
+          </a:prstGeom>
+        </p:spPr>
+      </p:pic>
     </p:spTree>
     <p:extLst>
       <p:ext uri="{BB962C8B-B14F-4D97-AF65-F5344CB8AC3E}">
@@ -5126,6 +5371,36 @@
           </a:p>
         </p:txBody>
       </p:sp>
+      <p:pic>
+        <p:nvPicPr>
+          <p:cNvPr id="4" name="Picture 3">
+            <a:extLst>
+              <a:ext uri="{FF2B5EF4-FFF2-40B4-BE49-F238E27FC236}">
+                <a16:creationId xmlns:a16="http://schemas.microsoft.com/office/drawing/2014/main" id="{23D21B7D-C04A-4226-BDD8-D9CB117380D1}"/>
+              </a:ext>
+            </a:extLst>
+          </p:cNvPr>
+          <p:cNvPicPr>
+            <a:picLocks noChangeAspect="1"/>
+          </p:cNvPicPr>
+          <p:nvPr/>
+        </p:nvPicPr>
+        <p:blipFill>
+          <a:blip r:embed="rId2"/>
+          <a:stretch>
+            <a:fillRect/>
+          </a:stretch>
+        </p:blipFill>
+        <p:spPr>
+          <a:xfrm>
+            <a:off x="9520543" y="5534287"/>
+            <a:ext cx="1657350" cy="990600"/>
+          </a:xfrm>
+          <a:prstGeom prst="rect">
+            <a:avLst/>
+          </a:prstGeom>
+        </p:spPr>
+      </p:pic>
     </p:spTree>
     <p:extLst>
       <p:ext uri="{BB962C8B-B14F-4D97-AF65-F5344CB8AC3E}">

</xml_diff>